<commit_message>
Added new class for rng
</commit_message>
<xml_diff>
--- a/hw3/Presentation1.pptx
+++ b/hw3/Presentation1.pptx
@@ -6,6 +6,7 @@
   </p:sldMasterIdLst>
   <p:sldIdLst>
     <p:sldId id="256" r:id="rId2"/>
+    <p:sldId id="257" r:id="rId3"/>
   </p:sldIdLst>
   <p:sldSz cx="12192000" cy="6858000"/>
   <p:notesSz cx="6858000" cy="9144000"/>
@@ -104,6 +105,11 @@
       </a:defRPr>
     </a:lvl9pPr>
   </p:defaultTextStyle>
+  <p:extLst>
+    <p:ext uri="{EFAFB233-063F-42B5-8137-9DF3F51BA10A}">
+      <p15:sldGuideLst xmlns:p15="http://schemas.microsoft.com/office/powerpoint/2012/main"/>
+    </p:ext>
+  </p:extLst>
 </p:presentation>
 </file>
 
@@ -254,7 +260,7 @@
           <a:p>
             <a:fld id="{6CAB02B1-9762-4C93-A786-2E40134C7DDD}" type="datetimeFigureOut">
               <a:rPr lang="en-US" smtClean="0"/>
-              <a:t>2/13/2022</a:t>
+              <a:t>2/23/2022</a:t>
             </a:fld>
             <a:endParaRPr lang="en-US"/>
           </a:p>
@@ -452,7 +458,7 @@
           <a:p>
             <a:fld id="{6CAB02B1-9762-4C93-A786-2E40134C7DDD}" type="datetimeFigureOut">
               <a:rPr lang="en-US" smtClean="0"/>
-              <a:t>2/13/2022</a:t>
+              <a:t>2/23/2022</a:t>
             </a:fld>
             <a:endParaRPr lang="en-US"/>
           </a:p>
@@ -660,7 +666,7 @@
           <a:p>
             <a:fld id="{6CAB02B1-9762-4C93-A786-2E40134C7DDD}" type="datetimeFigureOut">
               <a:rPr lang="en-US" smtClean="0"/>
-              <a:t>2/13/2022</a:t>
+              <a:t>2/23/2022</a:t>
             </a:fld>
             <a:endParaRPr lang="en-US"/>
           </a:p>
@@ -858,7 +864,7 @@
           <a:p>
             <a:fld id="{6CAB02B1-9762-4C93-A786-2E40134C7DDD}" type="datetimeFigureOut">
               <a:rPr lang="en-US" smtClean="0"/>
-              <a:t>2/13/2022</a:t>
+              <a:t>2/23/2022</a:t>
             </a:fld>
             <a:endParaRPr lang="en-US"/>
           </a:p>
@@ -1133,7 +1139,7 @@
           <a:p>
             <a:fld id="{6CAB02B1-9762-4C93-A786-2E40134C7DDD}" type="datetimeFigureOut">
               <a:rPr lang="en-US" smtClean="0"/>
-              <a:t>2/13/2022</a:t>
+              <a:t>2/23/2022</a:t>
             </a:fld>
             <a:endParaRPr lang="en-US"/>
           </a:p>
@@ -1398,7 +1404,7 @@
           <a:p>
             <a:fld id="{6CAB02B1-9762-4C93-A786-2E40134C7DDD}" type="datetimeFigureOut">
               <a:rPr lang="en-US" smtClean="0"/>
-              <a:t>2/13/2022</a:t>
+              <a:t>2/23/2022</a:t>
             </a:fld>
             <a:endParaRPr lang="en-US"/>
           </a:p>
@@ -1810,7 +1816,7 @@
           <a:p>
             <a:fld id="{6CAB02B1-9762-4C93-A786-2E40134C7DDD}" type="datetimeFigureOut">
               <a:rPr lang="en-US" smtClean="0"/>
-              <a:t>2/13/2022</a:t>
+              <a:t>2/23/2022</a:t>
             </a:fld>
             <a:endParaRPr lang="en-US"/>
           </a:p>
@@ -1951,7 +1957,7 @@
           <a:p>
             <a:fld id="{6CAB02B1-9762-4C93-A786-2E40134C7DDD}" type="datetimeFigureOut">
               <a:rPr lang="en-US" smtClean="0"/>
-              <a:t>2/13/2022</a:t>
+              <a:t>2/23/2022</a:t>
             </a:fld>
             <a:endParaRPr lang="en-US"/>
           </a:p>
@@ -2064,7 +2070,7 @@
           <a:p>
             <a:fld id="{6CAB02B1-9762-4C93-A786-2E40134C7DDD}" type="datetimeFigureOut">
               <a:rPr lang="en-US" smtClean="0"/>
-              <a:t>2/13/2022</a:t>
+              <a:t>2/23/2022</a:t>
             </a:fld>
             <a:endParaRPr lang="en-US"/>
           </a:p>
@@ -2375,7 +2381,7 @@
           <a:p>
             <a:fld id="{6CAB02B1-9762-4C93-A786-2E40134C7DDD}" type="datetimeFigureOut">
               <a:rPr lang="en-US" smtClean="0"/>
-              <a:t>2/13/2022</a:t>
+              <a:t>2/23/2022</a:t>
             </a:fld>
             <a:endParaRPr lang="en-US"/>
           </a:p>
@@ -2663,7 +2669,7 @@
           <a:p>
             <a:fld id="{6CAB02B1-9762-4C93-A786-2E40134C7DDD}" type="datetimeFigureOut">
               <a:rPr lang="en-US" smtClean="0"/>
-              <a:t>2/13/2022</a:t>
+              <a:t>2/23/2022</a:t>
             </a:fld>
             <a:endParaRPr lang="en-US"/>
           </a:p>
@@ -2904,7 +2910,7 @@
           <a:p>
             <a:fld id="{6CAB02B1-9762-4C93-A786-2E40134C7DDD}" type="datetimeFigureOut">
               <a:rPr lang="en-US" smtClean="0"/>
-              <a:t>2/13/2022</a:t>
+              <a:t>2/23/2022</a:t>
             </a:fld>
             <a:endParaRPr lang="en-US"/>
           </a:p>
@@ -3663,8 +3669,8 @@
           </a:fontRef>
         </p:style>
       </p:cxnSp>
-      <mc:AlternateContent xmlns:mc="http://schemas.openxmlformats.org/markup-compatibility/2006">
-        <mc:Choice xmlns:a14="http://schemas.microsoft.com/office/drawing/2010/main" Requires="a14">
+      <mc:AlternateContent xmlns:mc="http://schemas.openxmlformats.org/markup-compatibility/2006" xmlns:a14="http://schemas.microsoft.com/office/drawing/2010/main">
+        <mc:Choice Requires="a14">
           <p:sp>
             <p:nvSpPr>
               <p:cNvPr id="23" name="TextBox 22">
@@ -3693,6 +3699,7 @@
               </a:bodyPr>
               <a:lstStyle/>
               <a:p>
+                <a:pPr/>
                 <a14:m>
                   <m:oMathPara xmlns:m="http://schemas.openxmlformats.org/officeDocument/2006/math">
                     <m:oMathParaPr>
@@ -3732,7 +3739,7 @@
             </p:txBody>
           </p:sp>
         </mc:Choice>
-        <mc:Fallback>
+        <mc:Fallback xmlns="">
           <p:sp>
             <p:nvSpPr>
               <p:cNvPr id="23" name="TextBox 22">
@@ -3777,8 +3784,8 @@
           </p:sp>
         </mc:Fallback>
       </mc:AlternateContent>
-      <mc:AlternateContent xmlns:mc="http://schemas.openxmlformats.org/markup-compatibility/2006">
-        <mc:Choice xmlns:a14="http://schemas.microsoft.com/office/drawing/2010/main" Requires="a14">
+      <mc:AlternateContent xmlns:mc="http://schemas.openxmlformats.org/markup-compatibility/2006" xmlns:a14="http://schemas.microsoft.com/office/drawing/2010/main">
+        <mc:Choice Requires="a14">
           <p:sp>
             <p:nvSpPr>
               <p:cNvPr id="24" name="TextBox 23">
@@ -3807,6 +3814,7 @@
               </a:bodyPr>
               <a:lstStyle/>
               <a:p>
+                <a:pPr/>
                 <a14:m>
                   <m:oMathPara xmlns:m="http://schemas.openxmlformats.org/officeDocument/2006/math">
                     <m:oMathParaPr>
@@ -3846,7 +3854,7 @@
             </p:txBody>
           </p:sp>
         </mc:Choice>
-        <mc:Fallback>
+        <mc:Fallback xmlns="">
           <p:sp>
             <p:nvSpPr>
               <p:cNvPr id="24" name="TextBox 23">
@@ -3891,8 +3899,8 @@
           </p:sp>
         </mc:Fallback>
       </mc:AlternateContent>
-      <mc:AlternateContent xmlns:mc="http://schemas.openxmlformats.org/markup-compatibility/2006">
-        <mc:Choice xmlns:a14="http://schemas.microsoft.com/office/drawing/2010/main" Requires="a14">
+      <mc:AlternateContent xmlns:mc="http://schemas.openxmlformats.org/markup-compatibility/2006" xmlns:a14="http://schemas.microsoft.com/office/drawing/2010/main">
+        <mc:Choice Requires="a14">
           <p:sp>
             <p:nvSpPr>
               <p:cNvPr id="25" name="TextBox 24">
@@ -3921,6 +3929,7 @@
               </a:bodyPr>
               <a:lstStyle/>
               <a:p>
+                <a:pPr/>
                 <a14:m>
                   <m:oMathPara xmlns:m="http://schemas.openxmlformats.org/officeDocument/2006/math">
                     <m:oMathParaPr>
@@ -3960,7 +3969,7 @@
             </p:txBody>
           </p:sp>
         </mc:Choice>
-        <mc:Fallback>
+        <mc:Fallback xmlns="">
           <p:sp>
             <p:nvSpPr>
               <p:cNvPr id="25" name="TextBox 24">
@@ -4208,8 +4217,8 @@
           </a:fontRef>
         </p:style>
       </p:cxnSp>
-      <mc:AlternateContent xmlns:mc="http://schemas.openxmlformats.org/markup-compatibility/2006">
-        <mc:Choice xmlns:a14="http://schemas.microsoft.com/office/drawing/2010/main" Requires="a14">
+      <mc:AlternateContent xmlns:mc="http://schemas.openxmlformats.org/markup-compatibility/2006" xmlns:a14="http://schemas.microsoft.com/office/drawing/2010/main">
+        <mc:Choice Requires="a14">
           <p:sp>
             <p:nvSpPr>
               <p:cNvPr id="39" name="TextBox 38">
@@ -4238,6 +4247,7 @@
               </a:bodyPr>
               <a:lstStyle/>
               <a:p>
+                <a:pPr/>
                 <a14:m>
                   <m:oMathPara xmlns:m="http://schemas.openxmlformats.org/officeDocument/2006/math">
                     <m:oMathParaPr>
@@ -4258,7 +4268,7 @@
             </p:txBody>
           </p:sp>
         </mc:Choice>
-        <mc:Fallback>
+        <mc:Fallback xmlns="">
           <p:sp>
             <p:nvSpPr>
               <p:cNvPr id="39" name="TextBox 38">
@@ -4303,8 +4313,8 @@
           </p:sp>
         </mc:Fallback>
       </mc:AlternateContent>
-      <mc:AlternateContent xmlns:mc="http://schemas.openxmlformats.org/markup-compatibility/2006">
-        <mc:Choice xmlns:a14="http://schemas.microsoft.com/office/drawing/2010/main" Requires="a14">
+      <mc:AlternateContent xmlns:mc="http://schemas.openxmlformats.org/markup-compatibility/2006" xmlns:a14="http://schemas.microsoft.com/office/drawing/2010/main">
+        <mc:Choice Requires="a14">
           <p:sp>
             <p:nvSpPr>
               <p:cNvPr id="40" name="TextBox 39">
@@ -4333,6 +4343,7 @@
               </a:bodyPr>
               <a:lstStyle/>
               <a:p>
+                <a:pPr/>
                 <a14:m>
                   <m:oMathPara xmlns:m="http://schemas.openxmlformats.org/officeDocument/2006/math">
                     <m:oMathParaPr>
@@ -4372,7 +4383,7 @@
             </p:txBody>
           </p:sp>
         </mc:Choice>
-        <mc:Fallback>
+        <mc:Fallback xmlns="">
           <p:sp>
             <p:nvSpPr>
               <p:cNvPr id="40" name="TextBox 39">
@@ -4421,6 +4432,830 @@
     <p:extLst>
       <p:ext uri="{BB962C8B-B14F-4D97-AF65-F5344CB8AC3E}">
         <p14:creationId xmlns:p14="http://schemas.microsoft.com/office/powerpoint/2010/main" val="3082375030"/>
+      </p:ext>
+    </p:extLst>
+  </p:cSld>
+  <p:clrMapOvr>
+    <a:masterClrMapping/>
+  </p:clrMapOvr>
+</p:sld>
+</file>
+
+<file path=ppt/slides/slide2.xml><?xml version="1.0" encoding="utf-8"?>
+<p:sld xmlns:a="http://schemas.openxmlformats.org/drawingml/2006/main" xmlns:r="http://schemas.openxmlformats.org/officeDocument/2006/relationships" xmlns:p="http://schemas.openxmlformats.org/presentationml/2006/main">
+  <p:cSld>
+    <p:spTree>
+      <p:nvGrpSpPr>
+        <p:cNvPr id="1" name=""/>
+        <p:cNvGrpSpPr/>
+        <p:nvPr/>
+      </p:nvGrpSpPr>
+      <p:grpSpPr>
+        <a:xfrm>
+          <a:off x="0" y="0"/>
+          <a:ext cx="0" cy="0"/>
+          <a:chOff x="0" y="0"/>
+          <a:chExt cx="0" cy="0"/>
+        </a:xfrm>
+      </p:grpSpPr>
+      <p:sp>
+        <p:nvSpPr>
+          <p:cNvPr id="4" name="Oval 3">
+            <a:extLst>
+              <a:ext uri="{FF2B5EF4-FFF2-40B4-BE49-F238E27FC236}">
+                <a16:creationId xmlns:a16="http://schemas.microsoft.com/office/drawing/2014/main" id="{102625F6-3B95-486C-9FEE-99D0C5C80A33}"/>
+              </a:ext>
+            </a:extLst>
+          </p:cNvPr>
+          <p:cNvSpPr/>
+          <p:nvPr/>
+        </p:nvSpPr>
+        <p:spPr>
+          <a:xfrm>
+            <a:off x="1610684" y="1023457"/>
+            <a:ext cx="1384185" cy="1216404"/>
+          </a:xfrm>
+          <a:prstGeom prst="ellipse">
+            <a:avLst/>
+          </a:prstGeom>
+        </p:spPr>
+        <p:style>
+          <a:lnRef idx="2">
+            <a:schemeClr val="accent1">
+              <a:shade val="50000"/>
+            </a:schemeClr>
+          </a:lnRef>
+          <a:fillRef idx="1">
+            <a:schemeClr val="accent1"/>
+          </a:fillRef>
+          <a:effectRef idx="0">
+            <a:schemeClr val="accent1"/>
+          </a:effectRef>
+          <a:fontRef idx="minor">
+            <a:schemeClr val="lt1"/>
+          </a:fontRef>
+        </p:style>
+        <p:txBody>
+          <a:bodyPr rtlCol="0" anchor="ctr"/>
+          <a:lstStyle/>
+          <a:p>
+            <a:pPr marL="285750" indent="-285750" algn="ctr">
+              <a:buFont typeface="Arial" panose="020B0604020202020204" pitchFamily="34" charset="0"/>
+              <a:buChar char="•"/>
+            </a:pPr>
+            <a:r>
+              <a:rPr lang="en-US" sz="1200" dirty="0"/>
+              <a:t>Value</a:t>
+            </a:r>
+          </a:p>
+          <a:p>
+            <a:pPr marL="285750" indent="-285750" algn="ctr">
+              <a:buFont typeface="Arial" panose="020B0604020202020204" pitchFamily="34" charset="0"/>
+              <a:buChar char="•"/>
+            </a:pPr>
+            <a:r>
+              <a:rPr lang="en-US" sz="1200" dirty="0"/>
+              <a:t>Data</a:t>
+            </a:r>
+          </a:p>
+          <a:p>
+            <a:pPr marL="285750" indent="-285750" algn="ctr">
+              <a:buFont typeface="Arial" panose="020B0604020202020204" pitchFamily="34" charset="0"/>
+              <a:buChar char="•"/>
+            </a:pPr>
+            <a:r>
+              <a:rPr lang="en-US" sz="1200" dirty="0"/>
+              <a:t>Next</a:t>
+            </a:r>
+          </a:p>
+        </p:txBody>
+      </p:sp>
+      <p:sp>
+        <p:nvSpPr>
+          <p:cNvPr id="7" name="Oval 6">
+            <a:extLst>
+              <a:ext uri="{FF2B5EF4-FFF2-40B4-BE49-F238E27FC236}">
+                <a16:creationId xmlns:a16="http://schemas.microsoft.com/office/drawing/2014/main" id="{141D0876-B7FF-4FC5-A2D9-5BFA02FCA09D}"/>
+              </a:ext>
+            </a:extLst>
+          </p:cNvPr>
+          <p:cNvSpPr/>
+          <p:nvPr/>
+        </p:nvSpPr>
+        <p:spPr>
+          <a:xfrm>
+            <a:off x="4581785" y="1023457"/>
+            <a:ext cx="1384185" cy="1216404"/>
+          </a:xfrm>
+          <a:prstGeom prst="ellipse">
+            <a:avLst/>
+          </a:prstGeom>
+        </p:spPr>
+        <p:style>
+          <a:lnRef idx="2">
+            <a:schemeClr val="accent1">
+              <a:shade val="50000"/>
+            </a:schemeClr>
+          </a:lnRef>
+          <a:fillRef idx="1">
+            <a:schemeClr val="accent1"/>
+          </a:fillRef>
+          <a:effectRef idx="0">
+            <a:schemeClr val="accent1"/>
+          </a:effectRef>
+          <a:fontRef idx="minor">
+            <a:schemeClr val="lt1"/>
+          </a:fontRef>
+        </p:style>
+        <p:txBody>
+          <a:bodyPr rtlCol="0" anchor="ctr"/>
+          <a:lstStyle/>
+          <a:p>
+            <a:pPr marL="285750" indent="-285750" algn="ctr">
+              <a:buFont typeface="Arial" panose="020B0604020202020204" pitchFamily="34" charset="0"/>
+              <a:buChar char="•"/>
+            </a:pPr>
+            <a:r>
+              <a:rPr lang="en-US" sz="1200" dirty="0"/>
+              <a:t>Value</a:t>
+            </a:r>
+          </a:p>
+          <a:p>
+            <a:pPr marL="285750" indent="-285750" algn="ctr">
+              <a:buFont typeface="Arial" panose="020B0604020202020204" pitchFamily="34" charset="0"/>
+              <a:buChar char="•"/>
+            </a:pPr>
+            <a:r>
+              <a:rPr lang="en-US" sz="1200" dirty="0"/>
+              <a:t>Data</a:t>
+            </a:r>
+          </a:p>
+          <a:p>
+            <a:pPr marL="285750" indent="-285750" algn="ctr">
+              <a:buFont typeface="Arial" panose="020B0604020202020204" pitchFamily="34" charset="0"/>
+              <a:buChar char="•"/>
+            </a:pPr>
+            <a:r>
+              <a:rPr lang="en-US" sz="1200" dirty="0"/>
+              <a:t>Next</a:t>
+            </a:r>
+          </a:p>
+        </p:txBody>
+      </p:sp>
+      <p:sp>
+        <p:nvSpPr>
+          <p:cNvPr id="8" name="Oval 7">
+            <a:extLst>
+              <a:ext uri="{FF2B5EF4-FFF2-40B4-BE49-F238E27FC236}">
+                <a16:creationId xmlns:a16="http://schemas.microsoft.com/office/drawing/2014/main" id="{B4114C57-4031-461D-954D-3FACE2B982AE}"/>
+              </a:ext>
+            </a:extLst>
+          </p:cNvPr>
+          <p:cNvSpPr/>
+          <p:nvPr/>
+        </p:nvSpPr>
+        <p:spPr>
+          <a:xfrm>
+            <a:off x="7552886" y="1023457"/>
+            <a:ext cx="1384185" cy="1216404"/>
+          </a:xfrm>
+          <a:prstGeom prst="ellipse">
+            <a:avLst/>
+          </a:prstGeom>
+        </p:spPr>
+        <p:style>
+          <a:lnRef idx="2">
+            <a:schemeClr val="accent1">
+              <a:shade val="50000"/>
+            </a:schemeClr>
+          </a:lnRef>
+          <a:fillRef idx="1">
+            <a:schemeClr val="accent1"/>
+          </a:fillRef>
+          <a:effectRef idx="0">
+            <a:schemeClr val="accent1"/>
+          </a:effectRef>
+          <a:fontRef idx="minor">
+            <a:schemeClr val="lt1"/>
+          </a:fontRef>
+        </p:style>
+        <p:txBody>
+          <a:bodyPr rtlCol="0" anchor="ctr"/>
+          <a:lstStyle/>
+          <a:p>
+            <a:pPr marL="285750" indent="-285750" algn="ctr">
+              <a:buFont typeface="Arial" panose="020B0604020202020204" pitchFamily="34" charset="0"/>
+              <a:buChar char="•"/>
+            </a:pPr>
+            <a:r>
+              <a:rPr lang="en-US" sz="1200" dirty="0"/>
+              <a:t>Value</a:t>
+            </a:r>
+          </a:p>
+          <a:p>
+            <a:pPr marL="285750" indent="-285750" algn="ctr">
+              <a:buFont typeface="Arial" panose="020B0604020202020204" pitchFamily="34" charset="0"/>
+              <a:buChar char="•"/>
+            </a:pPr>
+            <a:r>
+              <a:rPr lang="en-US" sz="1200" dirty="0"/>
+              <a:t>Data</a:t>
+            </a:r>
+          </a:p>
+          <a:p>
+            <a:pPr marL="285750" indent="-285750" algn="ctr">
+              <a:buFont typeface="Arial" panose="020B0604020202020204" pitchFamily="34" charset="0"/>
+              <a:buChar char="•"/>
+            </a:pPr>
+            <a:r>
+              <a:rPr lang="en-US" sz="1200" dirty="0"/>
+              <a:t>Next</a:t>
+            </a:r>
+          </a:p>
+        </p:txBody>
+      </p:sp>
+      <p:sp>
+        <p:nvSpPr>
+          <p:cNvPr id="9" name="TextBox 8">
+            <a:extLst>
+              <a:ext uri="{FF2B5EF4-FFF2-40B4-BE49-F238E27FC236}">
+                <a16:creationId xmlns:a16="http://schemas.microsoft.com/office/drawing/2014/main" id="{D6432215-5223-444F-AF3C-35EA3A46E59C}"/>
+              </a:ext>
+            </a:extLst>
+          </p:cNvPr>
+          <p:cNvSpPr txBox="1"/>
+          <p:nvPr/>
+        </p:nvSpPr>
+        <p:spPr>
+          <a:xfrm>
+            <a:off x="4257409" y="3244334"/>
+            <a:ext cx="1216403" cy="369332"/>
+          </a:xfrm>
+          <a:prstGeom prst="rect">
+            <a:avLst/>
+          </a:prstGeom>
+          <a:noFill/>
+        </p:spPr>
+        <p:txBody>
+          <a:bodyPr wrap="square" rtlCol="0">
+            <a:spAutoFit/>
+          </a:bodyPr>
+          <a:lstStyle/>
+          <a:p>
+            <a:r>
+              <a:rPr lang="en-US" dirty="0" err="1"/>
+              <a:t>Self.HEAD</a:t>
+            </a:r>
+            <a:endParaRPr lang="en-US" dirty="0"/>
+          </a:p>
+        </p:txBody>
+      </p:sp>
+      <p:cxnSp>
+        <p:nvCxnSpPr>
+          <p:cNvPr id="11" name="Straight Arrow Connector 10">
+            <a:extLst>
+              <a:ext uri="{FF2B5EF4-FFF2-40B4-BE49-F238E27FC236}">
+                <a16:creationId xmlns:a16="http://schemas.microsoft.com/office/drawing/2014/main" id="{375404D6-02D0-478A-8972-2D8AF73A1A2D}"/>
+              </a:ext>
+            </a:extLst>
+          </p:cNvPr>
+          <p:cNvCxnSpPr/>
+          <p:nvPr/>
+        </p:nvCxnSpPr>
+        <p:spPr>
+          <a:xfrm flipV="1">
+            <a:off x="4756556" y="2239861"/>
+            <a:ext cx="218111" cy="937362"/>
+          </a:xfrm>
+          <a:prstGeom prst="straightConnector1">
+            <a:avLst/>
+          </a:prstGeom>
+          <a:ln>
+            <a:tailEnd type="triangle"/>
+          </a:ln>
+        </p:spPr>
+        <p:style>
+          <a:lnRef idx="1">
+            <a:schemeClr val="accent1"/>
+          </a:lnRef>
+          <a:fillRef idx="0">
+            <a:schemeClr val="accent1"/>
+          </a:fillRef>
+          <a:effectRef idx="0">
+            <a:schemeClr val="accent1"/>
+          </a:effectRef>
+          <a:fontRef idx="minor">
+            <a:schemeClr val="tx1"/>
+          </a:fontRef>
+        </p:style>
+      </p:cxnSp>
+      <p:cxnSp>
+        <p:nvCxnSpPr>
+          <p:cNvPr id="16" name="Straight Arrow Connector 15">
+            <a:extLst>
+              <a:ext uri="{FF2B5EF4-FFF2-40B4-BE49-F238E27FC236}">
+                <a16:creationId xmlns:a16="http://schemas.microsoft.com/office/drawing/2014/main" id="{7E93EF8C-6FED-4C0B-888C-FE0E640FE844}"/>
+              </a:ext>
+            </a:extLst>
+          </p:cNvPr>
+          <p:cNvCxnSpPr>
+            <a:endCxn id="7" idx="2"/>
+          </p:cNvCxnSpPr>
+          <p:nvPr/>
+        </p:nvCxnSpPr>
+        <p:spPr>
+          <a:xfrm flipV="1">
+            <a:off x="2667699" y="1631659"/>
+            <a:ext cx="1914086" cy="213919"/>
+          </a:xfrm>
+          <a:prstGeom prst="straightConnector1">
+            <a:avLst/>
+          </a:prstGeom>
+          <a:ln>
+            <a:tailEnd type="triangle"/>
+          </a:ln>
+        </p:spPr>
+        <p:style>
+          <a:lnRef idx="2">
+            <a:schemeClr val="dk1"/>
+          </a:lnRef>
+          <a:fillRef idx="0">
+            <a:schemeClr val="dk1"/>
+          </a:fillRef>
+          <a:effectRef idx="1">
+            <a:schemeClr val="dk1"/>
+          </a:effectRef>
+          <a:fontRef idx="minor">
+            <a:schemeClr val="tx1"/>
+          </a:fontRef>
+        </p:style>
+      </p:cxnSp>
+      <p:cxnSp>
+        <p:nvCxnSpPr>
+          <p:cNvPr id="17" name="Straight Arrow Connector 16">
+            <a:extLst>
+              <a:ext uri="{FF2B5EF4-FFF2-40B4-BE49-F238E27FC236}">
+                <a16:creationId xmlns:a16="http://schemas.microsoft.com/office/drawing/2014/main" id="{2F3B01C1-15A1-4320-9174-D659D9FF0559}"/>
+              </a:ext>
+            </a:extLst>
+          </p:cNvPr>
+          <p:cNvCxnSpPr/>
+          <p:nvPr/>
+        </p:nvCxnSpPr>
+        <p:spPr>
+          <a:xfrm flipV="1">
+            <a:off x="5639496" y="1631659"/>
+            <a:ext cx="1914086" cy="213919"/>
+          </a:xfrm>
+          <a:prstGeom prst="straightConnector1">
+            <a:avLst/>
+          </a:prstGeom>
+          <a:ln>
+            <a:tailEnd type="triangle"/>
+          </a:ln>
+        </p:spPr>
+        <p:style>
+          <a:lnRef idx="2">
+            <a:schemeClr val="dk1"/>
+          </a:lnRef>
+          <a:fillRef idx="0">
+            <a:schemeClr val="dk1"/>
+          </a:fillRef>
+          <a:effectRef idx="1">
+            <a:schemeClr val="dk1"/>
+          </a:effectRef>
+          <a:fontRef idx="minor">
+            <a:schemeClr val="tx1"/>
+          </a:fontRef>
+        </p:style>
+      </p:cxnSp>
+      <p:sp>
+        <p:nvSpPr>
+          <p:cNvPr id="19" name="Rectangle 18">
+            <a:extLst>
+              <a:ext uri="{FF2B5EF4-FFF2-40B4-BE49-F238E27FC236}">
+                <a16:creationId xmlns:a16="http://schemas.microsoft.com/office/drawing/2014/main" id="{94D616A9-909C-42D3-87A8-44179244E548}"/>
+              </a:ext>
+            </a:extLst>
+          </p:cNvPr>
+          <p:cNvSpPr/>
+          <p:nvPr/>
+        </p:nvSpPr>
+        <p:spPr>
+          <a:xfrm>
+            <a:off x="755009" y="5402726"/>
+            <a:ext cx="1287710" cy="1317072"/>
+          </a:xfrm>
+          <a:prstGeom prst="rect">
+            <a:avLst/>
+          </a:prstGeom>
+        </p:spPr>
+        <p:style>
+          <a:lnRef idx="2">
+            <a:schemeClr val="accent1">
+              <a:shade val="50000"/>
+            </a:schemeClr>
+          </a:lnRef>
+          <a:fillRef idx="1">
+            <a:schemeClr val="accent1"/>
+          </a:fillRef>
+          <a:effectRef idx="0">
+            <a:schemeClr val="accent1"/>
+          </a:effectRef>
+          <a:fontRef idx="minor">
+            <a:schemeClr val="lt1"/>
+          </a:fontRef>
+        </p:style>
+        <p:txBody>
+          <a:bodyPr rtlCol="0" anchor="ctr"/>
+          <a:lstStyle/>
+          <a:p>
+            <a:pPr algn="ctr"/>
+            <a:endParaRPr lang="en-US">
+              <a:ln w="0"/>
+              <a:solidFill>
+                <a:schemeClr val="tx1"/>
+              </a:solidFill>
+              <a:effectLst>
+                <a:outerShdw blurRad="38100" dist="19050" dir="2700000" algn="tl" rotWithShape="0">
+                  <a:schemeClr val="dk1">
+                    <a:alpha val="40000"/>
+                  </a:schemeClr>
+                </a:outerShdw>
+              </a:effectLst>
+            </a:endParaRPr>
+          </a:p>
+        </p:txBody>
+      </p:sp>
+      <p:sp>
+        <p:nvSpPr>
+          <p:cNvPr id="20" name="TextBox 19">
+            <a:extLst>
+              <a:ext uri="{FF2B5EF4-FFF2-40B4-BE49-F238E27FC236}">
+                <a16:creationId xmlns:a16="http://schemas.microsoft.com/office/drawing/2014/main" id="{2CDD25B8-5580-43A5-9895-5A4581E6D616}"/>
+              </a:ext>
+            </a:extLst>
+          </p:cNvPr>
+          <p:cNvSpPr txBox="1"/>
+          <p:nvPr/>
+        </p:nvSpPr>
+        <p:spPr>
+          <a:xfrm>
+            <a:off x="665579" y="5025005"/>
+            <a:ext cx="1453988" cy="369332"/>
+          </a:xfrm>
+          <a:prstGeom prst="rect">
+            <a:avLst/>
+          </a:prstGeom>
+          <a:noFill/>
+        </p:spPr>
+        <p:txBody>
+          <a:bodyPr wrap="none" rtlCol="0">
+            <a:spAutoFit/>
+          </a:bodyPr>
+          <a:lstStyle/>
+          <a:p>
+            <a:r>
+              <a:rPr lang="en-US" dirty="0"/>
+              <a:t>Log </a:t>
+            </a:r>
+            <a:r>
+              <a:rPr lang="en-US" dirty="0" err="1"/>
+              <a:t>datatable</a:t>
+            </a:r>
+            <a:endParaRPr lang="en-US" dirty="0"/>
+          </a:p>
+        </p:txBody>
+      </p:sp>
+      <p:sp>
+        <p:nvSpPr>
+          <p:cNvPr id="21" name="TextBox 20">
+            <a:extLst>
+              <a:ext uri="{FF2B5EF4-FFF2-40B4-BE49-F238E27FC236}">
+                <a16:creationId xmlns:a16="http://schemas.microsoft.com/office/drawing/2014/main" id="{5B692408-E072-4855-96C1-C15382FE5E88}"/>
+              </a:ext>
+            </a:extLst>
+          </p:cNvPr>
+          <p:cNvSpPr txBox="1"/>
+          <p:nvPr/>
+        </p:nvSpPr>
+        <p:spPr>
+          <a:xfrm>
+            <a:off x="7552886" y="3244334"/>
+            <a:ext cx="3604472" cy="1477328"/>
+          </a:xfrm>
+          <a:prstGeom prst="rect">
+            <a:avLst/>
+          </a:prstGeom>
+          <a:noFill/>
+        </p:spPr>
+        <p:txBody>
+          <a:bodyPr wrap="square" rtlCol="0">
+            <a:spAutoFit/>
+          </a:bodyPr>
+          <a:lstStyle/>
+          <a:p>
+            <a:r>
+              <a:rPr lang="en-US" dirty="0"/>
+              <a:t>Update()</a:t>
+            </a:r>
+          </a:p>
+          <a:p>
+            <a:pPr marL="342900" indent="-342900">
+              <a:buFont typeface="+mj-lt"/>
+              <a:buAutoNum type="arabicPeriod"/>
+            </a:pPr>
+            <a:endParaRPr lang="en-US" dirty="0"/>
+          </a:p>
+          <a:p>
+            <a:pPr marL="342900" indent="-342900">
+              <a:buFont typeface="+mj-lt"/>
+              <a:buAutoNum type="arabicPeriod"/>
+            </a:pPr>
+            <a:r>
+              <a:rPr lang="en-US" dirty="0"/>
+              <a:t>Get the next event</a:t>
+            </a:r>
+          </a:p>
+          <a:p>
+            <a:pPr marL="342900" indent="-342900">
+              <a:buFont typeface="+mj-lt"/>
+              <a:buAutoNum type="arabicPeriod"/>
+            </a:pPr>
+            <a:r>
+              <a:rPr lang="en-US" dirty="0"/>
+              <a:t>Run the event</a:t>
+            </a:r>
+          </a:p>
+          <a:p>
+            <a:pPr marL="342900" indent="-342900">
+              <a:buFont typeface="+mj-lt"/>
+              <a:buAutoNum type="arabicPeriod"/>
+            </a:pPr>
+            <a:r>
+              <a:rPr lang="en-US" dirty="0"/>
+              <a:t>Move head of linked list</a:t>
+            </a:r>
+          </a:p>
+        </p:txBody>
+      </p:sp>
+      <p:cxnSp>
+        <p:nvCxnSpPr>
+          <p:cNvPr id="25" name="Straight Arrow Connector 24">
+            <a:extLst>
+              <a:ext uri="{FF2B5EF4-FFF2-40B4-BE49-F238E27FC236}">
+                <a16:creationId xmlns:a16="http://schemas.microsoft.com/office/drawing/2014/main" id="{007A9DC7-FBE3-4EDC-94A1-D47723AD4CE6}"/>
+              </a:ext>
+            </a:extLst>
+          </p:cNvPr>
+          <p:cNvCxnSpPr/>
+          <p:nvPr/>
+        </p:nvCxnSpPr>
+        <p:spPr>
+          <a:xfrm>
+            <a:off x="1325461" y="402672"/>
+            <a:ext cx="7977930" cy="0"/>
+          </a:xfrm>
+          <a:prstGeom prst="straightConnector1">
+            <a:avLst/>
+          </a:prstGeom>
+          <a:ln>
+            <a:headEnd type="triangle"/>
+            <a:tailEnd type="triangle"/>
+          </a:ln>
+        </p:spPr>
+        <p:style>
+          <a:lnRef idx="2">
+            <a:schemeClr val="dk1"/>
+          </a:lnRef>
+          <a:fillRef idx="0">
+            <a:schemeClr val="dk1"/>
+          </a:fillRef>
+          <a:effectRef idx="1">
+            <a:schemeClr val="dk1"/>
+          </a:effectRef>
+          <a:fontRef idx="minor">
+            <a:schemeClr val="tx1"/>
+          </a:fontRef>
+        </p:style>
+      </p:cxnSp>
+      <p:cxnSp>
+        <p:nvCxnSpPr>
+          <p:cNvPr id="27" name="Straight Connector 26">
+            <a:extLst>
+              <a:ext uri="{FF2B5EF4-FFF2-40B4-BE49-F238E27FC236}">
+                <a16:creationId xmlns:a16="http://schemas.microsoft.com/office/drawing/2014/main" id="{728B53E6-D1CE-4FC7-B663-6A77C81ADC94}"/>
+              </a:ext>
+            </a:extLst>
+          </p:cNvPr>
+          <p:cNvCxnSpPr/>
+          <p:nvPr/>
+        </p:nvCxnSpPr>
+        <p:spPr>
+          <a:xfrm>
+            <a:off x="2231472" y="310393"/>
+            <a:ext cx="0" cy="184557"/>
+          </a:xfrm>
+          <a:prstGeom prst="line">
+            <a:avLst/>
+          </a:prstGeom>
+        </p:spPr>
+        <p:style>
+          <a:lnRef idx="1">
+            <a:schemeClr val="dk1"/>
+          </a:lnRef>
+          <a:fillRef idx="0">
+            <a:schemeClr val="dk1"/>
+          </a:fillRef>
+          <a:effectRef idx="0">
+            <a:schemeClr val="dk1"/>
+          </a:effectRef>
+          <a:fontRef idx="minor">
+            <a:schemeClr val="tx1"/>
+          </a:fontRef>
+        </p:style>
+      </p:cxnSp>
+      <p:sp>
+        <p:nvSpPr>
+          <p:cNvPr id="28" name="TextBox 27">
+            <a:extLst>
+              <a:ext uri="{FF2B5EF4-FFF2-40B4-BE49-F238E27FC236}">
+                <a16:creationId xmlns:a16="http://schemas.microsoft.com/office/drawing/2014/main" id="{42E13483-5B2C-42A9-9F68-5BA1585848F7}"/>
+              </a:ext>
+            </a:extLst>
+          </p:cNvPr>
+          <p:cNvSpPr txBox="1"/>
+          <p:nvPr/>
+        </p:nvSpPr>
+        <p:spPr>
+          <a:xfrm>
+            <a:off x="1946246" y="557948"/>
+            <a:ext cx="662730" cy="276999"/>
+          </a:xfrm>
+          <a:prstGeom prst="rect">
+            <a:avLst/>
+          </a:prstGeom>
+          <a:noFill/>
+        </p:spPr>
+        <p:txBody>
+          <a:bodyPr wrap="square" rtlCol="0">
+            <a:spAutoFit/>
+          </a:bodyPr>
+          <a:lstStyle/>
+          <a:p>
+            <a:r>
+              <a:rPr lang="en-US" sz="1200" dirty="0"/>
+              <a:t>Time 1</a:t>
+            </a:r>
+          </a:p>
+        </p:txBody>
+      </p:sp>
+      <p:cxnSp>
+        <p:nvCxnSpPr>
+          <p:cNvPr id="29" name="Straight Connector 28">
+            <a:extLst>
+              <a:ext uri="{FF2B5EF4-FFF2-40B4-BE49-F238E27FC236}">
+                <a16:creationId xmlns:a16="http://schemas.microsoft.com/office/drawing/2014/main" id="{8202F671-EF28-4E82-9B85-4695A3BA15C3}"/>
+              </a:ext>
+            </a:extLst>
+          </p:cNvPr>
+          <p:cNvCxnSpPr/>
+          <p:nvPr/>
+        </p:nvCxnSpPr>
+        <p:spPr>
+          <a:xfrm>
+            <a:off x="5378742" y="310393"/>
+            <a:ext cx="0" cy="184557"/>
+          </a:xfrm>
+          <a:prstGeom prst="line">
+            <a:avLst/>
+          </a:prstGeom>
+        </p:spPr>
+        <p:style>
+          <a:lnRef idx="1">
+            <a:schemeClr val="dk1"/>
+          </a:lnRef>
+          <a:fillRef idx="0">
+            <a:schemeClr val="dk1"/>
+          </a:fillRef>
+          <a:effectRef idx="0">
+            <a:schemeClr val="dk1"/>
+          </a:effectRef>
+          <a:fontRef idx="minor">
+            <a:schemeClr val="tx1"/>
+          </a:fontRef>
+        </p:style>
+      </p:cxnSp>
+      <p:sp>
+        <p:nvSpPr>
+          <p:cNvPr id="30" name="TextBox 29">
+            <a:extLst>
+              <a:ext uri="{FF2B5EF4-FFF2-40B4-BE49-F238E27FC236}">
+                <a16:creationId xmlns:a16="http://schemas.microsoft.com/office/drawing/2014/main" id="{678690E7-B037-4313-A250-9DB6C588E1B0}"/>
+              </a:ext>
+            </a:extLst>
+          </p:cNvPr>
+          <p:cNvSpPr txBox="1"/>
+          <p:nvPr/>
+        </p:nvSpPr>
+        <p:spPr>
+          <a:xfrm>
+            <a:off x="5093516" y="557948"/>
+            <a:ext cx="662730" cy="276999"/>
+          </a:xfrm>
+          <a:prstGeom prst="rect">
+            <a:avLst/>
+          </a:prstGeom>
+          <a:noFill/>
+        </p:spPr>
+        <p:txBody>
+          <a:bodyPr wrap="square" rtlCol="0">
+            <a:spAutoFit/>
+          </a:bodyPr>
+          <a:lstStyle/>
+          <a:p>
+            <a:r>
+              <a:rPr lang="en-US" sz="1200" dirty="0"/>
+              <a:t>Time 2</a:t>
+            </a:r>
+          </a:p>
+        </p:txBody>
+      </p:sp>
+      <p:cxnSp>
+        <p:nvCxnSpPr>
+          <p:cNvPr id="31" name="Straight Connector 30">
+            <a:extLst>
+              <a:ext uri="{FF2B5EF4-FFF2-40B4-BE49-F238E27FC236}">
+                <a16:creationId xmlns:a16="http://schemas.microsoft.com/office/drawing/2014/main" id="{9007E6F4-C556-441C-B728-1C85E886409B}"/>
+              </a:ext>
+            </a:extLst>
+          </p:cNvPr>
+          <p:cNvCxnSpPr/>
+          <p:nvPr/>
+        </p:nvCxnSpPr>
+        <p:spPr>
+          <a:xfrm>
+            <a:off x="8272944" y="310393"/>
+            <a:ext cx="0" cy="184557"/>
+          </a:xfrm>
+          <a:prstGeom prst="line">
+            <a:avLst/>
+          </a:prstGeom>
+        </p:spPr>
+        <p:style>
+          <a:lnRef idx="1">
+            <a:schemeClr val="dk1"/>
+          </a:lnRef>
+          <a:fillRef idx="0">
+            <a:schemeClr val="dk1"/>
+          </a:fillRef>
+          <a:effectRef idx="0">
+            <a:schemeClr val="dk1"/>
+          </a:effectRef>
+          <a:fontRef idx="minor">
+            <a:schemeClr val="tx1"/>
+          </a:fontRef>
+        </p:style>
+      </p:cxnSp>
+      <p:sp>
+        <p:nvSpPr>
+          <p:cNvPr id="32" name="TextBox 31">
+            <a:extLst>
+              <a:ext uri="{FF2B5EF4-FFF2-40B4-BE49-F238E27FC236}">
+                <a16:creationId xmlns:a16="http://schemas.microsoft.com/office/drawing/2014/main" id="{50C04EF3-B6BD-4B4F-8AF1-3FB86ECD7A4C}"/>
+              </a:ext>
+            </a:extLst>
+          </p:cNvPr>
+          <p:cNvSpPr txBox="1"/>
+          <p:nvPr/>
+        </p:nvSpPr>
+        <p:spPr>
+          <a:xfrm>
+            <a:off x="7987718" y="557948"/>
+            <a:ext cx="662730" cy="276999"/>
+          </a:xfrm>
+          <a:prstGeom prst="rect">
+            <a:avLst/>
+          </a:prstGeom>
+          <a:noFill/>
+        </p:spPr>
+        <p:txBody>
+          <a:bodyPr wrap="square" rtlCol="0">
+            <a:spAutoFit/>
+          </a:bodyPr>
+          <a:lstStyle/>
+          <a:p>
+            <a:r>
+              <a:rPr lang="en-US" sz="1200" dirty="0"/>
+              <a:t>Time 3</a:t>
+            </a:r>
+          </a:p>
+        </p:txBody>
+      </p:sp>
+    </p:spTree>
+    <p:extLst>
+      <p:ext uri="{BB962C8B-B14F-4D97-AF65-F5344CB8AC3E}">
+        <p14:creationId xmlns:p14="http://schemas.microsoft.com/office/powerpoint/2010/main" val="4023195565"/>
       </p:ext>
     </p:extLst>
   </p:cSld>

</xml_diff>